<commit_message>
the battle of five and the general
</commit_message>
<xml_diff>
--- a/models.pptx
+++ b/models.pptx
@@ -9,6 +9,20 @@
     <p:sldId id="257" r:id="rId4"/>
     <p:sldId id="258" r:id="rId5"/>
     <p:sldId id="259" r:id="rId6"/>
+    <p:sldId id="260" r:id="rId7"/>
+    <p:sldId id="261" r:id="rId8"/>
+    <p:sldId id="262" r:id="rId9"/>
+    <p:sldId id="263" r:id="rId10"/>
+    <p:sldId id="264" r:id="rId11"/>
+    <p:sldId id="265" r:id="rId12"/>
+    <p:sldId id="266" r:id="rId13"/>
+    <p:sldId id="267" r:id="rId14"/>
+    <p:sldId id="268" r:id="rId15"/>
+    <p:sldId id="269" r:id="rId16"/>
+    <p:sldId id="270" r:id="rId17"/>
+    <p:sldId id="271" r:id="rId18"/>
+    <p:sldId id="272" r:id="rId19"/>
+    <p:sldId id="273" r:id="rId20"/>
   </p:sldIdLst>
   <p:sldSz cx="10080625" cy="7559675"/>
   <p:notesSz cx="7559675" cy="10691812"/>
@@ -1949,7 +1963,7 @@
           <a:bodyPr lIns="0" rIns="0" tIns="0" bIns="0"/>
           <a:p>
             <a:pPr algn="r"/>
-            <a:fld id="{C5A1240C-072C-4D3A-9E3A-29171C10F913}" type="slidenum">
+            <a:fld id="{8A167B08-CD48-4CA3-9532-A81E6B58F2DB}" type="slidenum">
               <a:rPr b="0" lang="en-US" sz="1400" spc="-1" strike="noStrike">
                 <a:solidFill>
                   <a:srgbClr val="000000"/>
@@ -2096,6 +2110,1592 @@
           <p:childTnLst>
             <p:seq>
               <p:cTn id="2" nodeType="mainSeq"/>
+              <p:prevCondLst>
+                <p:cond delay="0" evt="onPrev">
+                  <p:tgtEl>
+                    <p:sldTgt/>
+                  </p:tgtEl>
+                </p:cond>
+              </p:prevCondLst>
+              <p:nextCondLst>
+                <p:cond delay="0" evt="onNext">
+                  <p:tgtEl>
+                    <p:sldTgt/>
+                  </p:tgtEl>
+                </p:cond>
+              </p:nextCondLst>
+            </p:seq>
+          </p:childTnLst>
+        </p:cTn>
+      </p:par>
+    </p:tnLst>
+  </p:timing>
+</p:sld>
+</file>
+
+<file path=ppt/slides/slide10.xml><?xml version="1.0" encoding="utf-8"?>
+<p:sld xmlns:a="http://schemas.openxmlformats.org/drawingml/2006/main" xmlns:p="http://schemas.openxmlformats.org/presentationml/2006/main" xmlns:r="http://schemas.openxmlformats.org/officeDocument/2006/relationships" xmlns:p14="http://schemas.microsoft.com/office/powerpoint/2010/main" xmlns:p15="http://schemas.microsoft.com/office/powerpoint/2012/main" xmlns:mc="http://schemas.openxmlformats.org/markup-compatibility/2006">
+  <p:cSld>
+    <p:spTree>
+      <p:nvGrpSpPr>
+        <p:cNvPr id="1" name=""/>
+        <p:cNvGrpSpPr/>
+        <p:nvPr/>
+      </p:nvGrpSpPr>
+      <p:grpSpPr>
+        <a:xfrm>
+          <a:off x="0" y="0"/>
+          <a:ext cx="0" cy="0"/>
+          <a:chOff x="0" y="0"/>
+          <a:chExt cx="0" cy="0"/>
+        </a:xfrm>
+      </p:grpSpPr>
+      <p:sp>
+        <p:nvSpPr>
+          <p:cNvPr id="63" name="TextShape 1"/>
+          <p:cNvSpPr txBox="1"/>
+          <p:nvPr/>
+        </p:nvSpPr>
+        <p:spPr>
+          <a:xfrm>
+            <a:off x="504000" y="301320"/>
+            <a:ext cx="9071640" cy="1262160"/>
+          </a:xfrm>
+          <a:prstGeom prst="rect">
+            <a:avLst/>
+          </a:prstGeom>
+          <a:noFill/>
+          <a:ln>
+            <a:noFill/>
+          </a:ln>
+        </p:spPr>
+        <p:txBody>
+          <a:bodyPr lIns="0" rIns="0" tIns="0" bIns="0" anchor="ctr"/>
+          <a:p>
+            <a:pPr algn="ctr"/>
+            <a:r>
+              <a:rPr b="0" lang="en-US" sz="4400" spc="-1" strike="noStrike">
+                <a:solidFill>
+                  <a:srgbClr val="000000"/>
+                </a:solidFill>
+                <a:uFill>
+                  <a:solidFill>
+                    <a:srgbClr val="ffffff"/>
+                  </a:solidFill>
+                </a:uFill>
+                <a:latin typeface="Arial"/>
+              </a:rPr>
+              <a:t>SVM – Soft margin, hard margin</a:t>
+            </a:r>
+            <a:endParaRPr b="0" lang="en-US" sz="4400" spc="-1" strike="noStrike">
+              <a:solidFill>
+                <a:srgbClr val="000000"/>
+              </a:solidFill>
+              <a:uFill>
+                <a:solidFill>
+                  <a:srgbClr val="ffffff"/>
+                </a:solidFill>
+              </a:uFill>
+              <a:latin typeface="Arial"/>
+            </a:endParaRPr>
+          </a:p>
+        </p:txBody>
+      </p:sp>
+      <p:pic>
+        <p:nvPicPr>
+          <p:cNvPr id="64" name="" descr=""/>
+          <p:cNvPicPr/>
+          <p:nvPr/>
+        </p:nvPicPr>
+        <p:blipFill>
+          <a:blip r:embed="rId1"/>
+          <a:stretch/>
+        </p:blipFill>
+        <p:spPr>
+          <a:xfrm>
+            <a:off x="413640" y="1660680"/>
+            <a:ext cx="9290880" cy="4815000"/>
+          </a:xfrm>
+          <a:prstGeom prst="rect">
+            <a:avLst/>
+          </a:prstGeom>
+          <a:ln>
+            <a:noFill/>
+          </a:ln>
+        </p:spPr>
+      </p:pic>
+    </p:spTree>
+  </p:cSld>
+  <p:timing>
+    <p:tnLst>
+      <p:par>
+        <p:cTn id="19" dur="indefinite" restart="never" nodeType="tmRoot">
+          <p:childTnLst>
+            <p:seq>
+              <p:cTn id="20" nodeType="mainSeq"/>
+              <p:prevCondLst>
+                <p:cond delay="0" evt="onPrev">
+                  <p:tgtEl>
+                    <p:sldTgt/>
+                  </p:tgtEl>
+                </p:cond>
+              </p:prevCondLst>
+              <p:nextCondLst>
+                <p:cond delay="0" evt="onNext">
+                  <p:tgtEl>
+                    <p:sldTgt/>
+                  </p:tgtEl>
+                </p:cond>
+              </p:nextCondLst>
+            </p:seq>
+          </p:childTnLst>
+        </p:cTn>
+      </p:par>
+    </p:tnLst>
+  </p:timing>
+</p:sld>
+</file>
+
+<file path=ppt/slides/slide11.xml><?xml version="1.0" encoding="utf-8"?>
+<p:sld xmlns:a="http://schemas.openxmlformats.org/drawingml/2006/main" xmlns:p="http://schemas.openxmlformats.org/presentationml/2006/main" xmlns:r="http://schemas.openxmlformats.org/officeDocument/2006/relationships" xmlns:p14="http://schemas.microsoft.com/office/powerpoint/2010/main" xmlns:p15="http://schemas.microsoft.com/office/powerpoint/2012/main" xmlns:mc="http://schemas.openxmlformats.org/markup-compatibility/2006">
+  <p:cSld>
+    <p:spTree>
+      <p:nvGrpSpPr>
+        <p:cNvPr id="1" name=""/>
+        <p:cNvGrpSpPr/>
+        <p:nvPr/>
+      </p:nvGrpSpPr>
+      <p:grpSpPr>
+        <a:xfrm>
+          <a:off x="0" y="0"/>
+          <a:ext cx="0" cy="0"/>
+          <a:chOff x="0" y="0"/>
+          <a:chExt cx="0" cy="0"/>
+        </a:xfrm>
+      </p:grpSpPr>
+      <p:sp>
+        <p:nvSpPr>
+          <p:cNvPr id="65" name="TextShape 1"/>
+          <p:cNvSpPr txBox="1"/>
+          <p:nvPr/>
+        </p:nvSpPr>
+        <p:spPr>
+          <a:xfrm>
+            <a:off x="504000" y="301320"/>
+            <a:ext cx="9071640" cy="1262160"/>
+          </a:xfrm>
+          <a:prstGeom prst="rect">
+            <a:avLst/>
+          </a:prstGeom>
+          <a:noFill/>
+          <a:ln>
+            <a:noFill/>
+          </a:ln>
+        </p:spPr>
+        <p:txBody>
+          <a:bodyPr lIns="0" rIns="0" tIns="0" bIns="0" anchor="ctr"/>
+          <a:p>
+            <a:pPr algn="ctr"/>
+            <a:r>
+              <a:rPr b="0" lang="en-US" sz="4400" spc="-1" strike="noStrike">
+                <a:solidFill>
+                  <a:srgbClr val="000000"/>
+                </a:solidFill>
+                <a:uFill>
+                  <a:solidFill>
+                    <a:srgbClr val="ffffff"/>
+                  </a:solidFill>
+                </a:uFill>
+                <a:latin typeface="Arial"/>
+              </a:rPr>
+              <a:t>Kernel trick</a:t>
+            </a:r>
+            <a:endParaRPr b="0" lang="en-US" sz="4400" spc="-1" strike="noStrike">
+              <a:solidFill>
+                <a:srgbClr val="000000"/>
+              </a:solidFill>
+              <a:uFill>
+                <a:solidFill>
+                  <a:srgbClr val="ffffff"/>
+                </a:solidFill>
+              </a:uFill>
+              <a:latin typeface="Arial"/>
+            </a:endParaRPr>
+          </a:p>
+        </p:txBody>
+      </p:sp>
+      <p:pic>
+        <p:nvPicPr>
+          <p:cNvPr id="66" name="" descr=""/>
+          <p:cNvPicPr/>
+          <p:nvPr/>
+        </p:nvPicPr>
+        <p:blipFill>
+          <a:blip r:embed="rId1"/>
+          <a:stretch/>
+        </p:blipFill>
+        <p:spPr>
+          <a:xfrm>
+            <a:off x="0" y="1661760"/>
+            <a:ext cx="10061280" cy="4647600"/>
+          </a:xfrm>
+          <a:prstGeom prst="rect">
+            <a:avLst/>
+          </a:prstGeom>
+          <a:ln>
+            <a:noFill/>
+          </a:ln>
+        </p:spPr>
+      </p:pic>
+    </p:spTree>
+  </p:cSld>
+  <p:timing>
+    <p:tnLst>
+      <p:par>
+        <p:cTn id="21" dur="indefinite" restart="never" nodeType="tmRoot">
+          <p:childTnLst>
+            <p:seq>
+              <p:cTn id="22" nodeType="mainSeq"/>
+              <p:prevCondLst>
+                <p:cond delay="0" evt="onPrev">
+                  <p:tgtEl>
+                    <p:sldTgt/>
+                  </p:tgtEl>
+                </p:cond>
+              </p:prevCondLst>
+              <p:nextCondLst>
+                <p:cond delay="0" evt="onNext">
+                  <p:tgtEl>
+                    <p:sldTgt/>
+                  </p:tgtEl>
+                </p:cond>
+              </p:nextCondLst>
+            </p:seq>
+          </p:childTnLst>
+        </p:cTn>
+      </p:par>
+    </p:tnLst>
+  </p:timing>
+</p:sld>
+</file>
+
+<file path=ppt/slides/slide12.xml><?xml version="1.0" encoding="utf-8"?>
+<p:sld xmlns:a="http://schemas.openxmlformats.org/drawingml/2006/main" xmlns:p="http://schemas.openxmlformats.org/presentationml/2006/main" xmlns:r="http://schemas.openxmlformats.org/officeDocument/2006/relationships" xmlns:p14="http://schemas.microsoft.com/office/powerpoint/2010/main" xmlns:p15="http://schemas.microsoft.com/office/powerpoint/2012/main" xmlns:mc="http://schemas.openxmlformats.org/markup-compatibility/2006">
+  <p:cSld>
+    <p:spTree>
+      <p:nvGrpSpPr>
+        <p:cNvPr id="1" name=""/>
+        <p:cNvGrpSpPr/>
+        <p:nvPr/>
+      </p:nvGrpSpPr>
+      <p:grpSpPr>
+        <a:xfrm>
+          <a:off x="0" y="0"/>
+          <a:ext cx="0" cy="0"/>
+          <a:chOff x="0" y="0"/>
+          <a:chExt cx="0" cy="0"/>
+        </a:xfrm>
+      </p:grpSpPr>
+      <p:sp>
+        <p:nvSpPr>
+          <p:cNvPr id="67" name="TextShape 1"/>
+          <p:cNvSpPr txBox="1"/>
+          <p:nvPr/>
+        </p:nvSpPr>
+        <p:spPr>
+          <a:xfrm>
+            <a:off x="504000" y="301320"/>
+            <a:ext cx="9071640" cy="1262160"/>
+          </a:xfrm>
+          <a:prstGeom prst="rect">
+            <a:avLst/>
+          </a:prstGeom>
+          <a:noFill/>
+          <a:ln>
+            <a:noFill/>
+          </a:ln>
+        </p:spPr>
+        <p:txBody>
+          <a:bodyPr lIns="0" rIns="0" tIns="0" bIns="0" anchor="ctr"/>
+          <a:p>
+            <a:pPr algn="ctr"/>
+            <a:r>
+              <a:rPr b="0" lang="en-US" sz="4400" spc="-1" strike="noStrike">
+                <a:solidFill>
+                  <a:srgbClr val="000000"/>
+                </a:solidFill>
+                <a:uFill>
+                  <a:solidFill>
+                    <a:srgbClr val="ffffff"/>
+                  </a:solidFill>
+                </a:uFill>
+                <a:latin typeface="Arial"/>
+              </a:rPr>
+              <a:t>Support Vector Regression</a:t>
+            </a:r>
+            <a:endParaRPr b="0" lang="en-US" sz="4400" spc="-1" strike="noStrike">
+              <a:solidFill>
+                <a:srgbClr val="000000"/>
+              </a:solidFill>
+              <a:uFill>
+                <a:solidFill>
+                  <a:srgbClr val="ffffff"/>
+                </a:solidFill>
+              </a:uFill>
+              <a:latin typeface="Arial"/>
+            </a:endParaRPr>
+          </a:p>
+        </p:txBody>
+      </p:sp>
+      <p:pic>
+        <p:nvPicPr>
+          <p:cNvPr id="68" name="" descr=""/>
+          <p:cNvPicPr/>
+          <p:nvPr/>
+        </p:nvPicPr>
+        <p:blipFill>
+          <a:blip r:embed="rId1"/>
+          <a:stretch/>
+        </p:blipFill>
+        <p:spPr>
+          <a:xfrm>
+            <a:off x="217800" y="1651320"/>
+            <a:ext cx="9809280" cy="4674600"/>
+          </a:xfrm>
+          <a:prstGeom prst="rect">
+            <a:avLst/>
+          </a:prstGeom>
+          <a:ln>
+            <a:noFill/>
+          </a:ln>
+        </p:spPr>
+      </p:pic>
+    </p:spTree>
+  </p:cSld>
+  <p:timing>
+    <p:tnLst>
+      <p:par>
+        <p:cTn id="23" dur="indefinite" restart="never" nodeType="tmRoot">
+          <p:childTnLst>
+            <p:seq>
+              <p:cTn id="24" nodeType="mainSeq"/>
+              <p:prevCondLst>
+                <p:cond delay="0" evt="onPrev">
+                  <p:tgtEl>
+                    <p:sldTgt/>
+                  </p:tgtEl>
+                </p:cond>
+              </p:prevCondLst>
+              <p:nextCondLst>
+                <p:cond delay="0" evt="onNext">
+                  <p:tgtEl>
+                    <p:sldTgt/>
+                  </p:tgtEl>
+                </p:cond>
+              </p:nextCondLst>
+            </p:seq>
+          </p:childTnLst>
+        </p:cTn>
+      </p:par>
+    </p:tnLst>
+  </p:timing>
+</p:sld>
+</file>
+
+<file path=ppt/slides/slide13.xml><?xml version="1.0" encoding="utf-8"?>
+<p:sld xmlns:a="http://schemas.openxmlformats.org/drawingml/2006/main" xmlns:p="http://schemas.openxmlformats.org/presentationml/2006/main" xmlns:r="http://schemas.openxmlformats.org/officeDocument/2006/relationships" xmlns:p14="http://schemas.microsoft.com/office/powerpoint/2010/main" xmlns:p15="http://schemas.microsoft.com/office/powerpoint/2012/main" xmlns:mc="http://schemas.openxmlformats.org/markup-compatibility/2006">
+  <p:cSld>
+    <p:spTree>
+      <p:nvGrpSpPr>
+        <p:cNvPr id="1" name=""/>
+        <p:cNvGrpSpPr/>
+        <p:nvPr/>
+      </p:nvGrpSpPr>
+      <p:grpSpPr>
+        <a:xfrm>
+          <a:off x="0" y="0"/>
+          <a:ext cx="0" cy="0"/>
+          <a:chOff x="0" y="0"/>
+          <a:chExt cx="0" cy="0"/>
+        </a:xfrm>
+      </p:grpSpPr>
+      <p:sp>
+        <p:nvSpPr>
+          <p:cNvPr id="69" name="TextShape 1"/>
+          <p:cNvSpPr txBox="1"/>
+          <p:nvPr/>
+        </p:nvSpPr>
+        <p:spPr>
+          <a:xfrm>
+            <a:off x="504000" y="301320"/>
+            <a:ext cx="9071640" cy="1262160"/>
+          </a:xfrm>
+          <a:prstGeom prst="rect">
+            <a:avLst/>
+          </a:prstGeom>
+          <a:noFill/>
+          <a:ln>
+            <a:noFill/>
+          </a:ln>
+        </p:spPr>
+        <p:txBody>
+          <a:bodyPr lIns="0" rIns="0" tIns="0" bIns="0" anchor="ctr"/>
+          <a:p>
+            <a:pPr algn="ctr"/>
+            <a:r>
+              <a:rPr b="0" lang="en-US" sz="4400" spc="-1" strike="noStrike">
+                <a:solidFill>
+                  <a:srgbClr val="000000"/>
+                </a:solidFill>
+                <a:uFill>
+                  <a:solidFill>
+                    <a:srgbClr val="ffffff"/>
+                  </a:solidFill>
+                </a:uFill>
+                <a:latin typeface="Arial"/>
+              </a:rPr>
+              <a:t>Speech Recognition</a:t>
+            </a:r>
+            <a:endParaRPr b="0" lang="en-US" sz="4400" spc="-1" strike="noStrike">
+              <a:solidFill>
+                <a:srgbClr val="000000"/>
+              </a:solidFill>
+              <a:uFill>
+                <a:solidFill>
+                  <a:srgbClr val="ffffff"/>
+                </a:solidFill>
+              </a:uFill>
+              <a:latin typeface="Arial"/>
+            </a:endParaRPr>
+          </a:p>
+        </p:txBody>
+      </p:sp>
+      <p:pic>
+        <p:nvPicPr>
+          <p:cNvPr id="70" name="" descr=""/>
+          <p:cNvPicPr/>
+          <p:nvPr/>
+        </p:nvPicPr>
+        <p:blipFill>
+          <a:blip r:embed="rId1"/>
+          <a:stretch/>
+        </p:blipFill>
+        <p:spPr>
+          <a:xfrm>
+            <a:off x="503640" y="1980000"/>
+            <a:ext cx="9071640" cy="3961800"/>
+          </a:xfrm>
+          <a:prstGeom prst="rect">
+            <a:avLst/>
+          </a:prstGeom>
+          <a:ln>
+            <a:noFill/>
+          </a:ln>
+        </p:spPr>
+      </p:pic>
+    </p:spTree>
+  </p:cSld>
+  <p:timing>
+    <p:tnLst>
+      <p:par>
+        <p:cTn id="25" dur="indefinite" restart="never" nodeType="tmRoot">
+          <p:childTnLst>
+            <p:seq>
+              <p:cTn id="26" nodeType="mainSeq"/>
+              <p:prevCondLst>
+                <p:cond delay="0" evt="onPrev">
+                  <p:tgtEl>
+                    <p:sldTgt/>
+                  </p:tgtEl>
+                </p:cond>
+              </p:prevCondLst>
+              <p:nextCondLst>
+                <p:cond delay="0" evt="onNext">
+                  <p:tgtEl>
+                    <p:sldTgt/>
+                  </p:tgtEl>
+                </p:cond>
+              </p:nextCondLst>
+            </p:seq>
+          </p:childTnLst>
+        </p:cTn>
+      </p:par>
+    </p:tnLst>
+  </p:timing>
+</p:sld>
+</file>
+
+<file path=ppt/slides/slide14.xml><?xml version="1.0" encoding="utf-8"?>
+<p:sld xmlns:a="http://schemas.openxmlformats.org/drawingml/2006/main" xmlns:p="http://schemas.openxmlformats.org/presentationml/2006/main" xmlns:r="http://schemas.openxmlformats.org/officeDocument/2006/relationships" xmlns:p14="http://schemas.microsoft.com/office/powerpoint/2010/main" xmlns:p15="http://schemas.microsoft.com/office/powerpoint/2012/main" xmlns:mc="http://schemas.openxmlformats.org/markup-compatibility/2006">
+  <p:cSld>
+    <p:spTree>
+      <p:nvGrpSpPr>
+        <p:cNvPr id="1" name=""/>
+        <p:cNvGrpSpPr/>
+        <p:nvPr/>
+      </p:nvGrpSpPr>
+      <p:grpSpPr>
+        <a:xfrm>
+          <a:off x="0" y="0"/>
+          <a:ext cx="0" cy="0"/>
+          <a:chOff x="0" y="0"/>
+          <a:chExt cx="0" cy="0"/>
+        </a:xfrm>
+      </p:grpSpPr>
+      <p:sp>
+        <p:nvSpPr>
+          <p:cNvPr id="71" name="TextShape 1"/>
+          <p:cNvSpPr txBox="1"/>
+          <p:nvPr/>
+        </p:nvSpPr>
+        <p:spPr>
+          <a:xfrm>
+            <a:off x="438120" y="182880"/>
+            <a:ext cx="9071640" cy="914400"/>
+          </a:xfrm>
+          <a:prstGeom prst="rect">
+            <a:avLst/>
+          </a:prstGeom>
+          <a:noFill/>
+          <a:ln>
+            <a:noFill/>
+          </a:ln>
+        </p:spPr>
+        <p:txBody>
+          <a:bodyPr lIns="0" rIns="0" tIns="0" bIns="0" anchor="ctr"/>
+          <a:p>
+            <a:pPr algn="ctr"/>
+            <a:r>
+              <a:rPr b="0" lang="en-US" sz="4400" spc="-1" strike="noStrike">
+                <a:solidFill>
+                  <a:srgbClr val="000000"/>
+                </a:solidFill>
+                <a:uFill>
+                  <a:solidFill>
+                    <a:srgbClr val="ffffff"/>
+                  </a:solidFill>
+                </a:uFill>
+                <a:latin typeface="Arial"/>
+              </a:rPr>
+              <a:t>Speech Recognition</a:t>
+            </a:r>
+            <a:endParaRPr b="0" lang="en-US" sz="4400" spc="-1" strike="noStrike">
+              <a:solidFill>
+                <a:srgbClr val="000000"/>
+              </a:solidFill>
+              <a:uFill>
+                <a:solidFill>
+                  <a:srgbClr val="ffffff"/>
+                </a:solidFill>
+              </a:uFill>
+              <a:latin typeface="Arial"/>
+            </a:endParaRPr>
+          </a:p>
+        </p:txBody>
+      </p:sp>
+      <p:pic>
+        <p:nvPicPr>
+          <p:cNvPr id="72" name="" descr=""/>
+          <p:cNvPicPr/>
+          <p:nvPr/>
+        </p:nvPicPr>
+        <p:blipFill>
+          <a:blip r:embed="rId1"/>
+          <a:stretch/>
+        </p:blipFill>
+        <p:spPr>
+          <a:xfrm>
+            <a:off x="440640" y="1401120"/>
+            <a:ext cx="9071640" cy="1982160"/>
+          </a:xfrm>
+          <a:prstGeom prst="rect">
+            <a:avLst/>
+          </a:prstGeom>
+          <a:ln>
+            <a:noFill/>
+          </a:ln>
+        </p:spPr>
+      </p:pic>
+      <p:pic>
+        <p:nvPicPr>
+          <p:cNvPr id="73" name="" descr=""/>
+          <p:cNvPicPr/>
+          <p:nvPr/>
+        </p:nvPicPr>
+        <p:blipFill>
+          <a:blip r:embed="rId2"/>
+          <a:stretch/>
+        </p:blipFill>
+        <p:spPr>
+          <a:xfrm>
+            <a:off x="887760" y="3673080"/>
+            <a:ext cx="8200800" cy="3276360"/>
+          </a:xfrm>
+          <a:prstGeom prst="rect">
+            <a:avLst/>
+          </a:prstGeom>
+          <a:ln>
+            <a:noFill/>
+          </a:ln>
+        </p:spPr>
+      </p:pic>
+    </p:spTree>
+  </p:cSld>
+  <p:timing>
+    <p:tnLst>
+      <p:par>
+        <p:cTn id="27" dur="indefinite" restart="never" nodeType="tmRoot">
+          <p:childTnLst>
+            <p:seq>
+              <p:cTn id="28" nodeType="mainSeq"/>
+              <p:prevCondLst>
+                <p:cond delay="0" evt="onPrev">
+                  <p:tgtEl>
+                    <p:sldTgt/>
+                  </p:tgtEl>
+                </p:cond>
+              </p:prevCondLst>
+              <p:nextCondLst>
+                <p:cond delay="0" evt="onNext">
+                  <p:tgtEl>
+                    <p:sldTgt/>
+                  </p:tgtEl>
+                </p:cond>
+              </p:nextCondLst>
+            </p:seq>
+          </p:childTnLst>
+        </p:cTn>
+      </p:par>
+    </p:tnLst>
+  </p:timing>
+</p:sld>
+</file>
+
+<file path=ppt/slides/slide15.xml><?xml version="1.0" encoding="utf-8"?>
+<p:sld xmlns:a="http://schemas.openxmlformats.org/drawingml/2006/main" xmlns:p="http://schemas.openxmlformats.org/presentationml/2006/main" xmlns:r="http://schemas.openxmlformats.org/officeDocument/2006/relationships" xmlns:p14="http://schemas.microsoft.com/office/powerpoint/2010/main" xmlns:p15="http://schemas.microsoft.com/office/powerpoint/2012/main" xmlns:mc="http://schemas.openxmlformats.org/markup-compatibility/2006">
+  <p:cSld>
+    <p:spTree>
+      <p:nvGrpSpPr>
+        <p:cNvPr id="1" name=""/>
+        <p:cNvGrpSpPr/>
+        <p:nvPr/>
+      </p:nvGrpSpPr>
+      <p:grpSpPr>
+        <a:xfrm>
+          <a:off x="0" y="0"/>
+          <a:ext cx="0" cy="0"/>
+          <a:chOff x="0" y="0"/>
+          <a:chExt cx="0" cy="0"/>
+        </a:xfrm>
+      </p:grpSpPr>
+      <p:sp>
+        <p:nvSpPr>
+          <p:cNvPr id="74" name="TextShape 1"/>
+          <p:cNvSpPr txBox="1"/>
+          <p:nvPr/>
+        </p:nvSpPr>
+        <p:spPr>
+          <a:xfrm>
+            <a:off x="504000" y="301320"/>
+            <a:ext cx="9071640" cy="1262160"/>
+          </a:xfrm>
+          <a:prstGeom prst="rect">
+            <a:avLst/>
+          </a:prstGeom>
+          <a:noFill/>
+          <a:ln>
+            <a:noFill/>
+          </a:ln>
+        </p:spPr>
+        <p:txBody>
+          <a:bodyPr lIns="0" rIns="0" tIns="0" bIns="0" anchor="ctr"/>
+          <a:p>
+            <a:pPr algn="ctr"/>
+            <a:r>
+              <a:rPr b="0" lang="en-US" sz="4400" spc="-1" strike="noStrike">
+                <a:solidFill>
+                  <a:srgbClr val="000000"/>
+                </a:solidFill>
+                <a:uFill>
+                  <a:solidFill>
+                    <a:srgbClr val="ffffff"/>
+                  </a:solidFill>
+                </a:uFill>
+                <a:latin typeface="Arial"/>
+              </a:rPr>
+              <a:t>Speech Recognition</a:t>
+            </a:r>
+            <a:endParaRPr b="0" lang="en-US" sz="4400" spc="-1" strike="noStrike">
+              <a:solidFill>
+                <a:srgbClr val="000000"/>
+              </a:solidFill>
+              <a:uFill>
+                <a:solidFill>
+                  <a:srgbClr val="ffffff"/>
+                </a:solidFill>
+              </a:uFill>
+              <a:latin typeface="Arial"/>
+            </a:endParaRPr>
+          </a:p>
+        </p:txBody>
+      </p:sp>
+      <p:pic>
+        <p:nvPicPr>
+          <p:cNvPr id="75" name="" descr=""/>
+          <p:cNvPicPr/>
+          <p:nvPr/>
+        </p:nvPicPr>
+        <p:blipFill>
+          <a:blip r:embed="rId1"/>
+          <a:stretch/>
+        </p:blipFill>
+        <p:spPr>
+          <a:xfrm>
+            <a:off x="1802160" y="1979640"/>
+            <a:ext cx="6473880" cy="3961800"/>
+          </a:xfrm>
+          <a:prstGeom prst="rect">
+            <a:avLst/>
+          </a:prstGeom>
+          <a:ln>
+            <a:noFill/>
+          </a:ln>
+        </p:spPr>
+      </p:pic>
+    </p:spTree>
+  </p:cSld>
+  <p:timing>
+    <p:tnLst>
+      <p:par>
+        <p:cTn id="29" dur="indefinite" restart="never" nodeType="tmRoot">
+          <p:childTnLst>
+            <p:seq>
+              <p:cTn id="30" nodeType="mainSeq"/>
+              <p:prevCondLst>
+                <p:cond delay="0" evt="onPrev">
+                  <p:tgtEl>
+                    <p:sldTgt/>
+                  </p:tgtEl>
+                </p:cond>
+              </p:prevCondLst>
+              <p:nextCondLst>
+                <p:cond delay="0" evt="onNext">
+                  <p:tgtEl>
+                    <p:sldTgt/>
+                  </p:tgtEl>
+                </p:cond>
+              </p:nextCondLst>
+            </p:seq>
+          </p:childTnLst>
+        </p:cTn>
+      </p:par>
+    </p:tnLst>
+  </p:timing>
+</p:sld>
+</file>
+
+<file path=ppt/slides/slide16.xml><?xml version="1.0" encoding="utf-8"?>
+<p:sld xmlns:a="http://schemas.openxmlformats.org/drawingml/2006/main" xmlns:p="http://schemas.openxmlformats.org/presentationml/2006/main" xmlns:r="http://schemas.openxmlformats.org/officeDocument/2006/relationships" xmlns:p14="http://schemas.microsoft.com/office/powerpoint/2010/main" xmlns:p15="http://schemas.microsoft.com/office/powerpoint/2012/main" xmlns:mc="http://schemas.openxmlformats.org/markup-compatibility/2006">
+  <p:cSld>
+    <p:spTree>
+      <p:nvGrpSpPr>
+        <p:cNvPr id="1" name=""/>
+        <p:cNvGrpSpPr/>
+        <p:nvPr/>
+      </p:nvGrpSpPr>
+      <p:grpSpPr>
+        <a:xfrm>
+          <a:off x="0" y="0"/>
+          <a:ext cx="0" cy="0"/>
+          <a:chOff x="0" y="0"/>
+          <a:chExt cx="0" cy="0"/>
+        </a:xfrm>
+      </p:grpSpPr>
+      <p:sp>
+        <p:nvSpPr>
+          <p:cNvPr id="76" name="TextShape 1"/>
+          <p:cNvSpPr txBox="1"/>
+          <p:nvPr/>
+        </p:nvSpPr>
+        <p:spPr>
+          <a:xfrm>
+            <a:off x="504000" y="301320"/>
+            <a:ext cx="9071640" cy="1262160"/>
+          </a:xfrm>
+          <a:prstGeom prst="rect">
+            <a:avLst/>
+          </a:prstGeom>
+          <a:noFill/>
+          <a:ln>
+            <a:noFill/>
+          </a:ln>
+        </p:spPr>
+        <p:txBody>
+          <a:bodyPr lIns="0" rIns="0" tIns="0" bIns="0" anchor="ctr"/>
+          <a:p>
+            <a:pPr algn="ctr"/>
+            <a:r>
+              <a:rPr b="0" lang="en-US" sz="4400" spc="-1" strike="noStrike">
+                <a:solidFill>
+                  <a:srgbClr val="000000"/>
+                </a:solidFill>
+                <a:uFill>
+                  <a:solidFill>
+                    <a:srgbClr val="ffffff"/>
+                  </a:solidFill>
+                </a:uFill>
+                <a:latin typeface="Arial"/>
+              </a:rPr>
+              <a:t>Speech Recognition</a:t>
+            </a:r>
+            <a:endParaRPr b="0" lang="en-US" sz="4400" spc="-1" strike="noStrike">
+              <a:solidFill>
+                <a:srgbClr val="000000"/>
+              </a:solidFill>
+              <a:uFill>
+                <a:solidFill>
+                  <a:srgbClr val="ffffff"/>
+                </a:solidFill>
+              </a:uFill>
+              <a:latin typeface="Arial"/>
+            </a:endParaRPr>
+          </a:p>
+        </p:txBody>
+      </p:sp>
+      <p:pic>
+        <p:nvPicPr>
+          <p:cNvPr id="77" name="" descr=""/>
+          <p:cNvPicPr/>
+          <p:nvPr/>
+        </p:nvPicPr>
+        <p:blipFill>
+          <a:blip r:embed="rId1"/>
+          <a:stretch/>
+        </p:blipFill>
+        <p:spPr>
+          <a:xfrm>
+            <a:off x="1429920" y="1779480"/>
+            <a:ext cx="5183280" cy="4621320"/>
+          </a:xfrm>
+          <a:prstGeom prst="rect">
+            <a:avLst/>
+          </a:prstGeom>
+          <a:ln>
+            <a:noFill/>
+          </a:ln>
+        </p:spPr>
+      </p:pic>
+    </p:spTree>
+  </p:cSld>
+  <p:timing>
+    <p:tnLst>
+      <p:par>
+        <p:cTn id="31" dur="indefinite" restart="never" nodeType="tmRoot">
+          <p:childTnLst>
+            <p:seq>
+              <p:cTn id="32" nodeType="mainSeq"/>
+              <p:prevCondLst>
+                <p:cond delay="0" evt="onPrev">
+                  <p:tgtEl>
+                    <p:sldTgt/>
+                  </p:tgtEl>
+                </p:cond>
+              </p:prevCondLst>
+              <p:nextCondLst>
+                <p:cond delay="0" evt="onNext">
+                  <p:tgtEl>
+                    <p:sldTgt/>
+                  </p:tgtEl>
+                </p:cond>
+              </p:nextCondLst>
+            </p:seq>
+          </p:childTnLst>
+        </p:cTn>
+      </p:par>
+    </p:tnLst>
+  </p:timing>
+</p:sld>
+</file>
+
+<file path=ppt/slides/slide17.xml><?xml version="1.0" encoding="utf-8"?>
+<p:sld xmlns:a="http://schemas.openxmlformats.org/drawingml/2006/main" xmlns:p="http://schemas.openxmlformats.org/presentationml/2006/main" xmlns:r="http://schemas.openxmlformats.org/officeDocument/2006/relationships" xmlns:p14="http://schemas.microsoft.com/office/powerpoint/2010/main" xmlns:p15="http://schemas.microsoft.com/office/powerpoint/2012/main" xmlns:mc="http://schemas.openxmlformats.org/markup-compatibility/2006">
+  <p:cSld>
+    <p:spTree>
+      <p:nvGrpSpPr>
+        <p:cNvPr id="1" name=""/>
+        <p:cNvGrpSpPr/>
+        <p:nvPr/>
+      </p:nvGrpSpPr>
+      <p:grpSpPr>
+        <a:xfrm>
+          <a:off x="0" y="0"/>
+          <a:ext cx="0" cy="0"/>
+          <a:chOff x="0" y="0"/>
+          <a:chExt cx="0" cy="0"/>
+        </a:xfrm>
+      </p:grpSpPr>
+      <p:sp>
+        <p:nvSpPr>
+          <p:cNvPr id="78" name="TextShape 1"/>
+          <p:cNvSpPr txBox="1"/>
+          <p:nvPr/>
+        </p:nvSpPr>
+        <p:spPr>
+          <a:xfrm>
+            <a:off x="504000" y="301320"/>
+            <a:ext cx="9071640" cy="1262160"/>
+          </a:xfrm>
+          <a:prstGeom prst="rect">
+            <a:avLst/>
+          </a:prstGeom>
+          <a:noFill/>
+          <a:ln>
+            <a:noFill/>
+          </a:ln>
+        </p:spPr>
+        <p:txBody>
+          <a:bodyPr lIns="0" rIns="0" tIns="0" bIns="0" anchor="ctr"/>
+          <a:p>
+            <a:pPr marL="216000" indent="-216000" algn="ctr">
+              <a:buClr>
+                <a:srgbClr val="000000"/>
+              </a:buClr>
+              <a:buSzPct val="45000"/>
+              <a:buFont typeface="Wingdings" charset="2"/>
+              <a:buChar char=""/>
+            </a:pPr>
+            <a:r>
+              <a:rPr b="0" lang="en-US" sz="4400" spc="-1" strike="noStrike">
+                <a:solidFill>
+                  <a:srgbClr val="000000"/>
+                </a:solidFill>
+                <a:uFill>
+                  <a:solidFill>
+                    <a:srgbClr val="ffffff"/>
+                  </a:solidFill>
+                </a:uFill>
+                <a:latin typeface="Arial"/>
+              </a:rPr>
+              <a:t>Sentiment Analysis - Textblob</a:t>
+            </a:r>
+            <a:endParaRPr b="0" lang="en-US" sz="4400" spc="-1" strike="noStrike">
+              <a:solidFill>
+                <a:srgbClr val="000000"/>
+              </a:solidFill>
+              <a:uFill>
+                <a:solidFill>
+                  <a:srgbClr val="ffffff"/>
+                </a:solidFill>
+              </a:uFill>
+              <a:latin typeface="Arial"/>
+            </a:endParaRPr>
+          </a:p>
+        </p:txBody>
+      </p:sp>
+      <p:sp>
+        <p:nvSpPr>
+          <p:cNvPr id="79" name="TextShape 2"/>
+          <p:cNvSpPr txBox="1"/>
+          <p:nvPr/>
+        </p:nvSpPr>
+        <p:spPr>
+          <a:xfrm>
+            <a:off x="504000" y="1769040"/>
+            <a:ext cx="9071640" cy="4384440"/>
+          </a:xfrm>
+          <a:prstGeom prst="rect">
+            <a:avLst/>
+          </a:prstGeom>
+          <a:noFill/>
+          <a:ln>
+            <a:noFill/>
+          </a:ln>
+        </p:spPr>
+        <p:txBody>
+          <a:bodyPr lIns="0" rIns="0" tIns="0" bIns="0"/>
+          <a:p>
+            <a:pPr marL="432000" indent="-324000">
+              <a:buClr>
+                <a:srgbClr val="000000"/>
+              </a:buClr>
+              <a:buSzPct val="45000"/>
+              <a:buFont typeface="Wingdings" charset="2"/>
+              <a:buChar char=""/>
+            </a:pPr>
+            <a:r>
+              <a:rPr b="0" lang="en-US" sz="3200" spc="-1" strike="noStrike">
+                <a:solidFill>
+                  <a:srgbClr val="000000"/>
+                </a:solidFill>
+                <a:uFill>
+                  <a:solidFill>
+                    <a:srgbClr val="ffffff"/>
+                  </a:solidFill>
+                </a:uFill>
+                <a:latin typeface="Arial"/>
+              </a:rPr>
+              <a:t>Sentiment Analysis- understanding and extracting feelings from data</a:t>
+            </a:r>
+            <a:endParaRPr b="0" lang="en-US" sz="3200" spc="-1" strike="noStrike">
+              <a:solidFill>
+                <a:srgbClr val="000000"/>
+              </a:solidFill>
+              <a:uFill>
+                <a:solidFill>
+                  <a:srgbClr val="ffffff"/>
+                </a:solidFill>
+              </a:uFill>
+              <a:latin typeface="Arial"/>
+            </a:endParaRPr>
+          </a:p>
+          <a:p>
+            <a:pPr marL="432000" indent="-324000">
+              <a:buClr>
+                <a:srgbClr val="000000"/>
+              </a:buClr>
+              <a:buSzPct val="45000"/>
+              <a:buFont typeface="Wingdings" charset="2"/>
+              <a:buChar char=""/>
+            </a:pPr>
+            <a:r>
+              <a:rPr b="0" lang="en-US" sz="3200" spc="-1" strike="noStrike">
+                <a:solidFill>
+                  <a:srgbClr val="000000"/>
+                </a:solidFill>
+                <a:uFill>
+                  <a:solidFill>
+                    <a:srgbClr val="ffffff"/>
+                  </a:solidFill>
+                </a:uFill>
+                <a:latin typeface="Arial"/>
+              </a:rPr>
+              <a:t>Textblob -  NLP </a:t>
+            </a:r>
+            <a:endParaRPr b="0" lang="en-US" sz="3200" spc="-1" strike="noStrike">
+              <a:solidFill>
+                <a:srgbClr val="000000"/>
+              </a:solidFill>
+              <a:uFill>
+                <a:solidFill>
+                  <a:srgbClr val="ffffff"/>
+                </a:solidFill>
+              </a:uFill>
+              <a:latin typeface="Arial"/>
+            </a:endParaRPr>
+          </a:p>
+          <a:p>
+            <a:pPr lvl="1" marL="864000" indent="-324000">
+              <a:buClr>
+                <a:srgbClr val="000000"/>
+              </a:buClr>
+              <a:buSzPct val="75000"/>
+              <a:buFont typeface="Symbol" charset="2"/>
+              <a:buChar char=""/>
+            </a:pPr>
+            <a:r>
+              <a:rPr b="0" lang="en-US" sz="2800" spc="-1" strike="noStrike">
+                <a:solidFill>
+                  <a:srgbClr val="000000"/>
+                </a:solidFill>
+                <a:uFill>
+                  <a:solidFill>
+                    <a:srgbClr val="ffffff"/>
+                  </a:solidFill>
+                </a:uFill>
+                <a:latin typeface="Arial"/>
+              </a:rPr>
+              <a:t>Tokenization</a:t>
+            </a:r>
+            <a:endParaRPr b="0" lang="en-US" sz="2800" spc="-1" strike="noStrike">
+              <a:solidFill>
+                <a:srgbClr val="000000"/>
+              </a:solidFill>
+              <a:uFill>
+                <a:solidFill>
+                  <a:srgbClr val="ffffff"/>
+                </a:solidFill>
+              </a:uFill>
+              <a:latin typeface="Arial"/>
+            </a:endParaRPr>
+          </a:p>
+          <a:p>
+            <a:pPr lvl="1" marL="864000" indent="-324000">
+              <a:buClr>
+                <a:srgbClr val="000000"/>
+              </a:buClr>
+              <a:buSzPct val="75000"/>
+              <a:buFont typeface="Symbol" charset="2"/>
+              <a:buChar char=""/>
+            </a:pPr>
+            <a:r>
+              <a:rPr b="0" lang="en-US" sz="2800" spc="-1" strike="noStrike">
+                <a:solidFill>
+                  <a:srgbClr val="000000"/>
+                </a:solidFill>
+                <a:uFill>
+                  <a:solidFill>
+                    <a:srgbClr val="ffffff"/>
+                  </a:solidFill>
+                </a:uFill>
+                <a:latin typeface="Arial"/>
+              </a:rPr>
+              <a:t>lexicon-based sentiment</a:t>
+            </a:r>
+            <a:endParaRPr b="0" lang="en-US" sz="2800" spc="-1" strike="noStrike">
+              <a:solidFill>
+                <a:srgbClr val="000000"/>
+              </a:solidFill>
+              <a:uFill>
+                <a:solidFill>
+                  <a:srgbClr val="ffffff"/>
+                </a:solidFill>
+              </a:uFill>
+              <a:latin typeface="Arial"/>
+            </a:endParaRPr>
+          </a:p>
+          <a:p>
+            <a:pPr lvl="1" marL="864000" indent="-324000">
+              <a:buClr>
+                <a:srgbClr val="000000"/>
+              </a:buClr>
+              <a:buSzPct val="75000"/>
+              <a:buFont typeface="Symbol" charset="2"/>
+              <a:buChar char=""/>
+            </a:pPr>
+            <a:r>
+              <a:rPr b="1" lang="en-US" sz="2800" spc="-1" strike="noStrike">
+                <a:solidFill>
+                  <a:srgbClr val="000000"/>
+                </a:solidFill>
+                <a:uFill>
+                  <a:solidFill>
+                    <a:srgbClr val="ffffff"/>
+                  </a:solidFill>
+                </a:uFill>
+                <a:latin typeface="Arial"/>
+              </a:rPr>
+              <a:t>polarity</a:t>
+            </a:r>
+            <a:r>
+              <a:rPr b="0" lang="en-US" sz="2800" spc="-1" strike="noStrike">
+                <a:solidFill>
+                  <a:srgbClr val="000000"/>
+                </a:solidFill>
+                <a:uFill>
+                  <a:solidFill>
+                    <a:srgbClr val="ffffff"/>
+                  </a:solidFill>
+                </a:uFill>
+                <a:latin typeface="Arial"/>
+              </a:rPr>
+              <a:t>- how positive or negative?</a:t>
+            </a:r>
+            <a:endParaRPr b="0" lang="en-US" sz="2800" spc="-1" strike="noStrike">
+              <a:solidFill>
+                <a:srgbClr val="000000"/>
+              </a:solidFill>
+              <a:uFill>
+                <a:solidFill>
+                  <a:srgbClr val="ffffff"/>
+                </a:solidFill>
+              </a:uFill>
+              <a:latin typeface="Arial"/>
+            </a:endParaRPr>
+          </a:p>
+          <a:p>
+            <a:pPr lvl="1" marL="864000" indent="-324000">
+              <a:buClr>
+                <a:srgbClr val="000000"/>
+              </a:buClr>
+              <a:buSzPct val="75000"/>
+              <a:buFont typeface="Symbol" charset="2"/>
+              <a:buChar char=""/>
+            </a:pPr>
+            <a:r>
+              <a:rPr b="1" lang="en-US" sz="2800" spc="-1" strike="noStrike">
+                <a:solidFill>
+                  <a:srgbClr val="000000"/>
+                </a:solidFill>
+                <a:uFill>
+                  <a:solidFill>
+                    <a:srgbClr val="ffffff"/>
+                  </a:solidFill>
+                </a:uFill>
+                <a:latin typeface="Arial"/>
+              </a:rPr>
+              <a:t>subjectivity</a:t>
+            </a:r>
+            <a:r>
+              <a:rPr b="0" lang="en-US" sz="2800" spc="-1" strike="noStrike">
+                <a:solidFill>
+                  <a:srgbClr val="000000"/>
+                </a:solidFill>
+                <a:uFill>
+                  <a:solidFill>
+                    <a:srgbClr val="ffffff"/>
+                  </a:solidFill>
+                </a:uFill>
+                <a:latin typeface="Arial"/>
+              </a:rPr>
+              <a:t>- opinion or fact?</a:t>
+            </a:r>
+            <a:endParaRPr b="0" lang="en-US" sz="2800" spc="-1" strike="noStrike">
+              <a:solidFill>
+                <a:srgbClr val="000000"/>
+              </a:solidFill>
+              <a:uFill>
+                <a:solidFill>
+                  <a:srgbClr val="ffffff"/>
+                </a:solidFill>
+              </a:uFill>
+              <a:latin typeface="Arial"/>
+            </a:endParaRPr>
+          </a:p>
+          <a:p>
+            <a:pPr lvl="1" marL="864000" indent="-324000">
+              <a:buClr>
+                <a:srgbClr val="000000"/>
+              </a:buClr>
+              <a:buSzPct val="75000"/>
+              <a:buFont typeface="Symbol" charset="2"/>
+              <a:buChar char=""/>
+            </a:pPr>
+            <a:r>
+              <a:rPr b="0" lang="en-US" sz="2800" spc="-1" strike="noStrike">
+                <a:solidFill>
+                  <a:srgbClr val="000000"/>
+                </a:solidFill>
+                <a:uFill>
+                  <a:solidFill>
+                    <a:srgbClr val="ffffff"/>
+                  </a:solidFill>
+                </a:uFill>
+                <a:latin typeface="Arial"/>
+              </a:rPr>
+              <a:t> </a:t>
+            </a:r>
+            <a:endParaRPr b="0" lang="en-US" sz="2800" spc="-1" strike="noStrike">
+              <a:solidFill>
+                <a:srgbClr val="000000"/>
+              </a:solidFill>
+              <a:uFill>
+                <a:solidFill>
+                  <a:srgbClr val="ffffff"/>
+                </a:solidFill>
+              </a:uFill>
+              <a:latin typeface="Arial"/>
+            </a:endParaRPr>
+          </a:p>
+          <a:p>
+            <a:pPr lvl="1" marL="864000" indent="-324000">
+              <a:buClr>
+                <a:srgbClr val="000000"/>
+              </a:buClr>
+              <a:buSzPct val="75000"/>
+              <a:buFont typeface="Symbol" charset="2"/>
+              <a:buChar char=""/>
+            </a:pPr>
+            <a:r>
+              <a:rPr b="0" lang="en-US" sz="2800" spc="-1" strike="noStrike">
+                <a:solidFill>
+                  <a:srgbClr val="000000"/>
+                </a:solidFill>
+                <a:uFill>
+                  <a:solidFill>
+                    <a:srgbClr val="ffffff"/>
+                  </a:solidFill>
+                </a:uFill>
+                <a:latin typeface="Arial"/>
+              </a:rPr>
+              <a:t> </a:t>
+            </a:r>
+            <a:endParaRPr b="0" lang="en-US" sz="2800" spc="-1" strike="noStrike">
+              <a:solidFill>
+                <a:srgbClr val="000000"/>
+              </a:solidFill>
+              <a:uFill>
+                <a:solidFill>
+                  <a:srgbClr val="ffffff"/>
+                </a:solidFill>
+              </a:uFill>
+              <a:latin typeface="Arial"/>
+            </a:endParaRPr>
+          </a:p>
+          <a:p>
+            <a:pPr marL="432000" indent="-324000">
+              <a:buClr>
+                <a:srgbClr val="000000"/>
+              </a:buClr>
+              <a:buSzPct val="45000"/>
+              <a:buFont typeface="Wingdings" charset="2"/>
+              <a:buChar char=""/>
+            </a:pPr>
+            <a:r>
+              <a:rPr b="0" lang="en-US" sz="3200" spc="-1" strike="noStrike">
+                <a:solidFill>
+                  <a:srgbClr val="000000"/>
+                </a:solidFill>
+                <a:uFill>
+                  <a:solidFill>
+                    <a:srgbClr val="ffffff"/>
+                  </a:solidFill>
+                </a:uFill>
+                <a:latin typeface="Arial"/>
+              </a:rPr>
+              <a:t>https://textblob.readthedocs.io/en/dev/quickstart.html#sentiment-analysis</a:t>
+            </a:r>
+            <a:endParaRPr b="0" lang="en-US" sz="3200" spc="-1" strike="noStrike">
+              <a:solidFill>
+                <a:srgbClr val="000000"/>
+              </a:solidFill>
+              <a:uFill>
+                <a:solidFill>
+                  <a:srgbClr val="ffffff"/>
+                </a:solidFill>
+              </a:uFill>
+              <a:latin typeface="Arial"/>
+            </a:endParaRPr>
+          </a:p>
+        </p:txBody>
+      </p:sp>
+      <p:pic>
+        <p:nvPicPr>
+          <p:cNvPr id="80" name="" descr=""/>
+          <p:cNvPicPr/>
+          <p:nvPr/>
+        </p:nvPicPr>
+        <p:blipFill>
+          <a:blip r:embed="rId1"/>
+          <a:stretch/>
+        </p:blipFill>
+        <p:spPr>
+          <a:xfrm>
+            <a:off x="6062040" y="2743200"/>
+            <a:ext cx="2990520" cy="2037960"/>
+          </a:xfrm>
+          <a:prstGeom prst="rect">
+            <a:avLst/>
+          </a:prstGeom>
+          <a:ln>
+            <a:noFill/>
+          </a:ln>
+        </p:spPr>
+      </p:pic>
+    </p:spTree>
+  </p:cSld>
+  <p:timing>
+    <p:tnLst>
+      <p:par>
+        <p:cTn id="33" dur="indefinite" restart="never" nodeType="tmRoot">
+          <p:childTnLst>
+            <p:seq>
+              <p:cTn id="34" nodeType="mainSeq"/>
+              <p:prevCondLst>
+                <p:cond delay="0" evt="onPrev">
+                  <p:tgtEl>
+                    <p:sldTgt/>
+                  </p:tgtEl>
+                </p:cond>
+              </p:prevCondLst>
+              <p:nextCondLst>
+                <p:cond delay="0" evt="onNext">
+                  <p:tgtEl>
+                    <p:sldTgt/>
+                  </p:tgtEl>
+                </p:cond>
+              </p:nextCondLst>
+            </p:seq>
+          </p:childTnLst>
+        </p:cTn>
+      </p:par>
+    </p:tnLst>
+  </p:timing>
+</p:sld>
+</file>
+
+<file path=ppt/slides/slide18.xml><?xml version="1.0" encoding="utf-8"?>
+<p:sld xmlns:a="http://schemas.openxmlformats.org/drawingml/2006/main" xmlns:p="http://schemas.openxmlformats.org/presentationml/2006/main" xmlns:r="http://schemas.openxmlformats.org/officeDocument/2006/relationships" xmlns:p14="http://schemas.microsoft.com/office/powerpoint/2010/main" xmlns:p15="http://schemas.microsoft.com/office/powerpoint/2012/main" xmlns:mc="http://schemas.openxmlformats.org/markup-compatibility/2006">
+  <p:cSld>
+    <p:spTree>
+      <p:nvGrpSpPr>
+        <p:cNvPr id="1" name=""/>
+        <p:cNvGrpSpPr/>
+        <p:nvPr/>
+      </p:nvGrpSpPr>
+      <p:grpSpPr>
+        <a:xfrm>
+          <a:off x="0" y="0"/>
+          <a:ext cx="0" cy="0"/>
+          <a:chOff x="0" y="0"/>
+          <a:chExt cx="0" cy="0"/>
+        </a:xfrm>
+      </p:grpSpPr>
+      <p:pic>
+        <p:nvPicPr>
+          <p:cNvPr id="81" name="" descr=""/>
+          <p:cNvPicPr/>
+          <p:nvPr/>
+        </p:nvPicPr>
+        <p:blipFill>
+          <a:blip r:embed="rId1"/>
+          <a:stretch/>
+        </p:blipFill>
+        <p:spPr>
+          <a:xfrm>
+            <a:off x="1161720" y="0"/>
+            <a:ext cx="7505640" cy="7109280"/>
+          </a:xfrm>
+          <a:prstGeom prst="rect">
+            <a:avLst/>
+          </a:prstGeom>
+          <a:ln>
+            <a:noFill/>
+          </a:ln>
+        </p:spPr>
+      </p:pic>
+      <p:sp>
+        <p:nvSpPr>
+          <p:cNvPr id="82" name="TextShape 1"/>
+          <p:cNvSpPr txBox="1"/>
+          <p:nvPr/>
+        </p:nvSpPr>
+        <p:spPr>
+          <a:xfrm>
+            <a:off x="914400" y="6309360"/>
+            <a:ext cx="8503920" cy="346320"/>
+          </a:xfrm>
+          <a:prstGeom prst="rect">
+            <a:avLst/>
+          </a:prstGeom>
+          <a:noFill/>
+          <a:ln>
+            <a:noFill/>
+          </a:ln>
+        </p:spPr>
+        <p:txBody>
+          <a:bodyPr lIns="90000" rIns="90000" tIns="45000" bIns="45000"/>
+          <a:p>
+            <a:r>
+              <a:rPr b="1" lang="en-US" sz="1800" spc="-1" strike="noStrike">
+                <a:solidFill>
+                  <a:srgbClr val="000000"/>
+                </a:solidFill>
+                <a:uFill>
+                  <a:solidFill>
+                    <a:srgbClr val="ffffff"/>
+                  </a:solidFill>
+                </a:uFill>
+                <a:latin typeface="Arial"/>
+              </a:rPr>
+              <a:t>	</a:t>
+            </a:r>
+            <a:r>
+              <a:rPr b="1" lang="en-US" sz="1800" spc="-1" strike="noStrike">
+                <a:solidFill>
+                  <a:srgbClr val="000000"/>
+                </a:solidFill>
+                <a:uFill>
+                  <a:solidFill>
+                    <a:srgbClr val="ffffff"/>
+                  </a:solidFill>
+                </a:uFill>
+                <a:latin typeface="Arial"/>
+              </a:rPr>
+              <a:t>	</a:t>
+            </a:r>
+            <a:r>
+              <a:rPr b="1" lang="en-US" sz="1800" spc="-1" strike="noStrike">
+                <a:solidFill>
+                  <a:srgbClr val="000000"/>
+                </a:solidFill>
+                <a:uFill>
+                  <a:solidFill>
+                    <a:srgbClr val="ffffff"/>
+                  </a:solidFill>
+                </a:uFill>
+                <a:latin typeface="Arial"/>
+              </a:rPr>
+              <a:t>	</a:t>
+            </a:r>
+            <a:r>
+              <a:rPr b="1" lang="en-US" sz="1800" spc="-1" strike="noStrike">
+                <a:solidFill>
+                  <a:srgbClr val="000000"/>
+                </a:solidFill>
+                <a:uFill>
+                  <a:solidFill>
+                    <a:srgbClr val="ffffff"/>
+                  </a:solidFill>
+                </a:uFill>
+                <a:latin typeface="Arial"/>
+              </a:rPr>
+              <a:t>	</a:t>
+            </a:r>
+            <a:r>
+              <a:rPr b="1" lang="en-US" sz="1800" spc="-1" strike="noStrike">
+                <a:solidFill>
+                  <a:srgbClr val="000000"/>
+                </a:solidFill>
+                <a:uFill>
+                  <a:solidFill>
+                    <a:srgbClr val="ffffff"/>
+                  </a:solidFill>
+                </a:uFill>
+                <a:latin typeface="Arial"/>
+              </a:rPr>
+              <a:t>	</a:t>
+            </a:r>
+            <a:r>
+              <a:rPr b="1" lang="en-US" sz="1800" spc="-1" strike="noStrike">
+                <a:solidFill>
+                  <a:srgbClr val="000000"/>
+                </a:solidFill>
+                <a:uFill>
+                  <a:solidFill>
+                    <a:srgbClr val="ffffff"/>
+                  </a:solidFill>
+                </a:uFill>
+                <a:latin typeface="Arial"/>
+              </a:rPr>
+              <a:t>	</a:t>
+            </a:r>
+            <a:r>
+              <a:rPr b="1" lang="en-US" sz="1800" spc="-1" strike="noStrike">
+                <a:solidFill>
+                  <a:srgbClr val="000000"/>
+                </a:solidFill>
+                <a:uFill>
+                  <a:solidFill>
+                    <a:srgbClr val="ffffff"/>
+                  </a:solidFill>
+                </a:uFill>
+                <a:latin typeface="Arial"/>
+              </a:rPr>
+              <a:t>Time to Build this Robot</a:t>
+            </a:r>
+            <a:endParaRPr b="1" lang="en-US" sz="1800" spc="-1" strike="noStrike">
+              <a:solidFill>
+                <a:srgbClr val="000000"/>
+              </a:solidFill>
+              <a:uFill>
+                <a:solidFill>
+                  <a:srgbClr val="ffffff"/>
+                </a:solidFill>
+              </a:uFill>
+              <a:latin typeface="Arial"/>
+            </a:endParaRPr>
+          </a:p>
+        </p:txBody>
+      </p:sp>
+    </p:spTree>
+  </p:cSld>
+  <p:timing>
+    <p:tnLst>
+      <p:par>
+        <p:cTn id="35" dur="indefinite" restart="never" nodeType="tmRoot">
+          <p:childTnLst>
+            <p:seq>
+              <p:cTn id="36" nodeType="mainSeq"/>
               <p:prevCondLst>
                 <p:cond delay="0" evt="onPrev">
                   <p:tgtEl>
@@ -2873,8 +4473,8 @@
         </p:nvSpPr>
         <p:spPr>
           <a:xfrm>
-            <a:off x="504000" y="653040"/>
-            <a:ext cx="9071640" cy="4384440"/>
+            <a:off x="432000" y="221040"/>
+            <a:ext cx="9071640" cy="3802320"/>
           </a:xfrm>
           <a:prstGeom prst="rect">
             <a:avLst/>
@@ -2907,7 +4507,7 @@
                 </a:uFill>
                 <a:latin typeface="Arial"/>
               </a:rPr>
-              <a:t>environment setup </a:t>
+              <a:t>Environment setup </a:t>
             </a:r>
             <a:endParaRPr b="0" lang="en-US" sz="3200" spc="-1" strike="noStrike">
               <a:solidFill>
@@ -2977,7 +4577,7 @@
                 </a:uFill>
                 <a:latin typeface="Arial"/>
               </a:rPr>
-              <a:t>Pip</a:t>
+              <a:t>Scipy</a:t>
             </a:r>
             <a:endParaRPr b="0" lang="en-US" sz="2800" spc="-1" strike="noStrike">
               <a:solidFill>
@@ -3012,7 +4612,7 @@
                 </a:uFill>
                 <a:latin typeface="Arial"/>
               </a:rPr>
-              <a:t>Scipy</a:t>
+              <a:t>Numpy</a:t>
             </a:r>
             <a:endParaRPr b="0" lang="en-US" sz="2800" spc="-1" strike="noStrike">
               <a:solidFill>
@@ -3047,7 +4647,7 @@
                 </a:uFill>
                 <a:latin typeface="Arial"/>
               </a:rPr>
-              <a:t>Numpy</a:t>
+              <a:t>SpeechRecognition</a:t>
             </a:r>
             <a:endParaRPr b="0" lang="en-US" sz="2800" spc="-1" strike="noStrike">
               <a:solidFill>
@@ -3082,7 +4682,7 @@
                 </a:uFill>
                 <a:latin typeface="Arial"/>
               </a:rPr>
-              <a:t>SpeechRecognition</a:t>
+              <a:t>Scikit-learn</a:t>
             </a:r>
             <a:endParaRPr b="0" lang="en-US" sz="2800" spc="-1" strike="noStrike">
               <a:solidFill>
@@ -3117,9 +4717,67 @@
                 </a:uFill>
                 <a:latin typeface="Arial"/>
               </a:rPr>
-              <a:t>Scikit-learn</a:t>
+              <a:t>Textblob</a:t>
             </a:r>
             <a:endParaRPr b="0" lang="en-US" sz="2800" spc="-1" strike="noStrike">
+              <a:solidFill>
+                <a:srgbClr val="000000"/>
+              </a:solidFill>
+              <a:uFill>
+                <a:solidFill>
+                  <a:srgbClr val="ffffff"/>
+                </a:solidFill>
+              </a:uFill>
+              <a:latin typeface="Arial"/>
+            </a:endParaRPr>
+          </a:p>
+        </p:txBody>
+      </p:sp>
+      <p:sp>
+        <p:nvSpPr>
+          <p:cNvPr id="51" name="TextShape 2"/>
+          <p:cNvSpPr txBox="1"/>
+          <p:nvPr/>
+        </p:nvSpPr>
+        <p:spPr>
+          <a:xfrm>
+            <a:off x="274320" y="4145760"/>
+            <a:ext cx="9071640" cy="1457280"/>
+          </a:xfrm>
+          <a:prstGeom prst="rect">
+            <a:avLst/>
+          </a:prstGeom>
+          <a:noFill/>
+          <a:ln>
+            <a:noFill/>
+          </a:ln>
+        </p:spPr>
+        <p:txBody>
+          <a:bodyPr lIns="0" rIns="0" tIns="0" bIns="0"/>
+          <a:p>
+            <a:pPr marL="432000" indent="-324000">
+              <a:buClr>
+                <a:srgbClr val="000000"/>
+              </a:buClr>
+              <a:buSzPct val="45000"/>
+              <a:buFont typeface="Wingdings" charset="2"/>
+              <a:buChar char=""/>
+            </a:pPr>
+            <a:r>
+              <a:rPr b="0" lang="en-US" sz="3200" spc="-1" strike="noStrike">
+                <a:solidFill>
+                  <a:srgbClr val="000000"/>
+                </a:solidFill>
+                <a:uFill>
+                  <a:solidFill>
+                    <a:srgbClr val="ffffff"/>
+                  </a:solidFill>
+                </a:uFill>
+                <a:latin typeface="Arial"/>
+              </a:rPr>
+              <a:t>Script – Linux ubuntu </a:t>
+            </a:r>
+            <a:endParaRPr b="0" lang="en-US" sz="3200" spc="-1" strike="noStrike">
               <a:solidFill>
                 <a:srgbClr val="000000"/>
               </a:solidFill>
@@ -3151,8 +4809,102 @@
                   </a:solidFill>
                 </a:uFill>
                 <a:latin typeface="Arial"/>
-              </a:rPr>
-              <a:t>Textblob</a:t>
+                <a:hlinkClick r:id="rId1"/>
+              </a:rPr>
+              <a:t>https://github.com/tanmoy12/data_models/blob/master/env.txt</a:t>
+            </a:r>
+            <a:endParaRPr b="0" lang="en-US" sz="2800" spc="-1" strike="noStrike">
+              <a:solidFill>
+                <a:srgbClr val="000000"/>
+              </a:solidFill>
+              <a:uFill>
+                <a:solidFill>
+                  <a:srgbClr val="ffffff"/>
+                </a:solidFill>
+              </a:uFill>
+              <a:latin typeface="Arial"/>
+            </a:endParaRPr>
+          </a:p>
+        </p:txBody>
+      </p:sp>
+      <p:sp>
+        <p:nvSpPr>
+          <p:cNvPr id="52" name="TextShape 3"/>
+          <p:cNvSpPr txBox="1"/>
+          <p:nvPr/>
+        </p:nvSpPr>
+        <p:spPr>
+          <a:xfrm>
+            <a:off x="238320" y="5661360"/>
+            <a:ext cx="9071640" cy="1238400"/>
+          </a:xfrm>
+          <a:prstGeom prst="rect">
+            <a:avLst/>
+          </a:prstGeom>
+          <a:noFill/>
+          <a:ln>
+            <a:noFill/>
+          </a:ln>
+        </p:spPr>
+        <p:txBody>
+          <a:bodyPr lIns="0" rIns="0" tIns="0" bIns="0"/>
+          <a:p>
+            <a:pPr marL="432000" indent="-324000">
+              <a:buClr>
+                <a:srgbClr val="000000"/>
+              </a:buClr>
+              <a:buSzPct val="45000"/>
+              <a:buFont typeface="Wingdings" charset="2"/>
+              <a:buChar char=""/>
+            </a:pPr>
+            <a:r>
+              <a:rPr b="0" lang="en-US" sz="3200" spc="-1" strike="noStrike">
+                <a:solidFill>
+                  <a:srgbClr val="000000"/>
+                </a:solidFill>
+                <a:uFill>
+                  <a:solidFill>
+                    <a:srgbClr val="ffffff"/>
+                  </a:solidFill>
+                </a:uFill>
+                <a:latin typeface="Arial"/>
+              </a:rPr>
+              <a:t>Repository</a:t>
+            </a:r>
+            <a:endParaRPr b="0" lang="en-US" sz="3200" spc="-1" strike="noStrike">
+              <a:solidFill>
+                <a:srgbClr val="000000"/>
+              </a:solidFill>
+              <a:uFill>
+                <a:solidFill>
+                  <a:srgbClr val="ffffff"/>
+                </a:solidFill>
+              </a:uFill>
+              <a:latin typeface="Arial"/>
+            </a:endParaRPr>
+          </a:p>
+          <a:p>
+            <a:pPr lvl="1" marL="864000" indent="-324000">
+              <a:buClr>
+                <a:srgbClr val="000000"/>
+              </a:buClr>
+              <a:buSzPct val="75000"/>
+              <a:buFont typeface="Symbol" charset="2"/>
+              <a:buChar char=""/>
+            </a:pPr>
+            <a:r>
+              <a:rPr b="0" lang="en-US" sz="2800" spc="-1" strike="noStrike">
+                <a:solidFill>
+                  <a:srgbClr val="000000"/>
+                </a:solidFill>
+                <a:uFill>
+                  <a:solidFill>
+                    <a:srgbClr val="ffffff"/>
+                  </a:solidFill>
+                </a:uFill>
+                <a:latin typeface="Arial"/>
+              </a:rPr>
+              <a:t>https://github.com/tanmoy12/data_models</a:t>
             </a:r>
             <a:endParaRPr b="0" lang="en-US" sz="2800" spc="-1" strike="noStrike">
               <a:solidFill>
@@ -3177,6 +4929,728 @@
           <p:childTnLst>
             <p:seq>
               <p:cTn id="8" nodeType="mainSeq"/>
+              <p:prevCondLst>
+                <p:cond delay="0" evt="onPrev">
+                  <p:tgtEl>
+                    <p:sldTgt/>
+                  </p:tgtEl>
+                </p:cond>
+              </p:prevCondLst>
+              <p:nextCondLst>
+                <p:cond delay="0" evt="onNext">
+                  <p:tgtEl>
+                    <p:sldTgt/>
+                  </p:tgtEl>
+                </p:cond>
+              </p:nextCondLst>
+            </p:seq>
+          </p:childTnLst>
+        </p:cTn>
+      </p:par>
+    </p:tnLst>
+  </p:timing>
+</p:sld>
+</file>
+
+<file path=ppt/slides/slide5.xml><?xml version="1.0" encoding="utf-8"?>
+<p:sld xmlns:a="http://schemas.openxmlformats.org/drawingml/2006/main" xmlns:p="http://schemas.openxmlformats.org/presentationml/2006/main" xmlns:r="http://schemas.openxmlformats.org/officeDocument/2006/relationships" xmlns:p14="http://schemas.microsoft.com/office/powerpoint/2010/main" xmlns:p15="http://schemas.microsoft.com/office/powerpoint/2012/main" xmlns:mc="http://schemas.openxmlformats.org/markup-compatibility/2006">
+  <p:cSld>
+    <p:spTree>
+      <p:nvGrpSpPr>
+        <p:cNvPr id="1" name=""/>
+        <p:cNvGrpSpPr/>
+        <p:nvPr/>
+      </p:nvGrpSpPr>
+      <p:grpSpPr>
+        <a:xfrm>
+          <a:off x="0" y="0"/>
+          <a:ext cx="0" cy="0"/>
+          <a:chOff x="0" y="0"/>
+          <a:chExt cx="0" cy="0"/>
+        </a:xfrm>
+      </p:grpSpPr>
+      <p:sp>
+        <p:nvSpPr>
+          <p:cNvPr id="53" name="TextShape 1"/>
+          <p:cNvSpPr txBox="1"/>
+          <p:nvPr/>
+        </p:nvSpPr>
+        <p:spPr>
+          <a:xfrm>
+            <a:off x="504000" y="249480"/>
+            <a:ext cx="9071640" cy="625320"/>
+          </a:xfrm>
+          <a:prstGeom prst="rect">
+            <a:avLst/>
+          </a:prstGeom>
+          <a:noFill/>
+          <a:ln>
+            <a:noFill/>
+          </a:ln>
+        </p:spPr>
+        <p:txBody>
+          <a:bodyPr lIns="0" rIns="0" tIns="0" bIns="0" anchor="ctr"/>
+          <a:p>
+            <a:pPr algn="ctr"/>
+            <a:r>
+              <a:rPr b="0" lang="en-US" sz="4400" spc="-1" strike="noStrike">
+                <a:solidFill>
+                  <a:srgbClr val="000000"/>
+                </a:solidFill>
+                <a:uFill>
+                  <a:solidFill>
+                    <a:srgbClr val="ffffff"/>
+                  </a:solidFill>
+                </a:uFill>
+                <a:latin typeface="Arial"/>
+              </a:rPr>
+              <a:t>Decision Tree</a:t>
+            </a:r>
+            <a:endParaRPr b="0" lang="en-US" sz="4400" spc="-1" strike="noStrike">
+              <a:solidFill>
+                <a:srgbClr val="000000"/>
+              </a:solidFill>
+              <a:uFill>
+                <a:solidFill>
+                  <a:srgbClr val="ffffff"/>
+                </a:solidFill>
+              </a:uFill>
+              <a:latin typeface="Arial"/>
+            </a:endParaRPr>
+          </a:p>
+        </p:txBody>
+      </p:sp>
+      <p:pic>
+        <p:nvPicPr>
+          <p:cNvPr id="54" name="" descr=""/>
+          <p:cNvPicPr/>
+          <p:nvPr/>
+        </p:nvPicPr>
+        <p:blipFill>
+          <a:blip r:embed="rId1"/>
+          <a:stretch/>
+        </p:blipFill>
+        <p:spPr>
+          <a:xfrm>
+            <a:off x="298080" y="946800"/>
+            <a:ext cx="9594360" cy="6440400"/>
+          </a:xfrm>
+          <a:prstGeom prst="rect">
+            <a:avLst/>
+          </a:prstGeom>
+          <a:ln>
+            <a:noFill/>
+          </a:ln>
+        </p:spPr>
+      </p:pic>
+    </p:spTree>
+  </p:cSld>
+  <p:timing>
+    <p:tnLst>
+      <p:par>
+        <p:cTn id="9" dur="indefinite" restart="never" nodeType="tmRoot">
+          <p:childTnLst>
+            <p:seq>
+              <p:cTn id="10" nodeType="mainSeq"/>
+              <p:prevCondLst>
+                <p:cond delay="0" evt="onPrev">
+                  <p:tgtEl>
+                    <p:sldTgt/>
+                  </p:tgtEl>
+                </p:cond>
+              </p:prevCondLst>
+              <p:nextCondLst>
+                <p:cond delay="0" evt="onNext">
+                  <p:tgtEl>
+                    <p:sldTgt/>
+                  </p:tgtEl>
+                </p:cond>
+              </p:nextCondLst>
+            </p:seq>
+          </p:childTnLst>
+        </p:cTn>
+      </p:par>
+    </p:tnLst>
+  </p:timing>
+</p:sld>
+</file>
+
+<file path=ppt/slides/slide6.xml><?xml version="1.0" encoding="utf-8"?>
+<p:sld xmlns:a="http://schemas.openxmlformats.org/drawingml/2006/main" xmlns:p="http://schemas.openxmlformats.org/presentationml/2006/main" xmlns:r="http://schemas.openxmlformats.org/officeDocument/2006/relationships" xmlns:p14="http://schemas.microsoft.com/office/powerpoint/2010/main" xmlns:p15="http://schemas.microsoft.com/office/powerpoint/2012/main" xmlns:mc="http://schemas.openxmlformats.org/markup-compatibility/2006">
+  <p:cSld>
+    <p:spTree>
+      <p:nvGrpSpPr>
+        <p:cNvPr id="1" name=""/>
+        <p:cNvGrpSpPr/>
+        <p:nvPr/>
+      </p:nvGrpSpPr>
+      <p:grpSpPr>
+        <a:xfrm>
+          <a:off x="0" y="0"/>
+          <a:ext cx="0" cy="0"/>
+          <a:chOff x="0" y="0"/>
+          <a:chExt cx="0" cy="0"/>
+        </a:xfrm>
+      </p:grpSpPr>
+      <p:pic>
+        <p:nvPicPr>
+          <p:cNvPr id="55" name="" descr=""/>
+          <p:cNvPicPr/>
+          <p:nvPr/>
+        </p:nvPicPr>
+        <p:blipFill>
+          <a:blip r:embed="rId1"/>
+          <a:stretch/>
+        </p:blipFill>
+        <p:spPr>
+          <a:xfrm>
+            <a:off x="271440" y="598680"/>
+            <a:ext cx="9515160" cy="3114360"/>
+          </a:xfrm>
+          <a:prstGeom prst="rect">
+            <a:avLst/>
+          </a:prstGeom>
+          <a:ln>
+            <a:noFill/>
+          </a:ln>
+        </p:spPr>
+      </p:pic>
+      <p:sp>
+        <p:nvSpPr>
+          <p:cNvPr id="56" name="TextShape 1"/>
+          <p:cNvSpPr txBox="1"/>
+          <p:nvPr/>
+        </p:nvSpPr>
+        <p:spPr>
+          <a:xfrm>
+            <a:off x="640080" y="4206240"/>
+            <a:ext cx="7680960" cy="1370160"/>
+          </a:xfrm>
+          <a:prstGeom prst="rect">
+            <a:avLst/>
+          </a:prstGeom>
+          <a:noFill/>
+          <a:ln>
+            <a:noFill/>
+          </a:ln>
+        </p:spPr>
+        <p:txBody>
+          <a:bodyPr lIns="90000" rIns="90000" tIns="45000" bIns="45000"/>
+          <a:p>
+            <a:r>
+              <a:rPr b="0" lang="en-US" sz="1800" spc="-1" strike="noStrike">
+                <a:solidFill>
+                  <a:srgbClr val="000000"/>
+                </a:solidFill>
+                <a:uFill>
+                  <a:solidFill>
+                    <a:srgbClr val="ffffff"/>
+                  </a:solidFill>
+                </a:uFill>
+                <a:latin typeface="Arial"/>
+              </a:rPr>
+              <a:t>Feature wise - building trees - </a:t>
+            </a:r>
+            <a:endParaRPr b="0" lang="en-US" sz="1800" spc="-1" strike="noStrike">
+              <a:solidFill>
+                <a:srgbClr val="000000"/>
+              </a:solidFill>
+              <a:uFill>
+                <a:solidFill>
+                  <a:srgbClr val="ffffff"/>
+                </a:solidFill>
+              </a:uFill>
+              <a:latin typeface="Arial"/>
+            </a:endParaRPr>
+          </a:p>
+          <a:p>
+            <a:r>
+              <a:rPr b="0" lang="en-US" sz="1800" spc="-1" strike="noStrike">
+                <a:solidFill>
+                  <a:srgbClr val="000000"/>
+                </a:solidFill>
+                <a:uFill>
+                  <a:solidFill>
+                    <a:srgbClr val="ffffff"/>
+                  </a:solidFill>
+                </a:uFill>
+                <a:latin typeface="Arial"/>
+              </a:rPr>
+              <a:t>	</a:t>
+            </a:r>
+            <a:endParaRPr b="0" lang="en-US" sz="1800" spc="-1" strike="noStrike">
+              <a:solidFill>
+                <a:srgbClr val="000000"/>
+              </a:solidFill>
+              <a:uFill>
+                <a:solidFill>
+                  <a:srgbClr val="ffffff"/>
+                </a:solidFill>
+              </a:uFill>
+              <a:latin typeface="Arial"/>
+            </a:endParaRPr>
+          </a:p>
+          <a:p>
+            <a:r>
+              <a:rPr b="0" lang="en-US" sz="1800" spc="-1" strike="noStrike">
+                <a:solidFill>
+                  <a:srgbClr val="000000"/>
+                </a:solidFill>
+                <a:uFill>
+                  <a:solidFill>
+                    <a:srgbClr val="ffffff"/>
+                  </a:solidFill>
+                </a:uFill>
+                <a:latin typeface="Arial"/>
+              </a:rPr>
+              <a:t>Entropy/information gain </a:t>
+            </a:r>
+            <a:endParaRPr b="0" lang="en-US" sz="1800" spc="-1" strike="noStrike">
+              <a:solidFill>
+                <a:srgbClr val="000000"/>
+              </a:solidFill>
+              <a:uFill>
+                <a:solidFill>
+                  <a:srgbClr val="ffffff"/>
+                </a:solidFill>
+              </a:uFill>
+              <a:latin typeface="Arial"/>
+            </a:endParaRPr>
+          </a:p>
+          <a:p>
+            <a:r>
+              <a:rPr b="0" lang="en-US" sz="1800" spc="-1" strike="noStrike">
+                <a:solidFill>
+                  <a:srgbClr val="000000"/>
+                </a:solidFill>
+                <a:uFill>
+                  <a:solidFill>
+                    <a:srgbClr val="ffffff"/>
+                  </a:solidFill>
+                </a:uFill>
+                <a:latin typeface="Arial"/>
+              </a:rPr>
+              <a:t>	</a:t>
+            </a:r>
+            <a:endParaRPr b="0" lang="en-US" sz="1800" spc="-1" strike="noStrike">
+              <a:solidFill>
+                <a:srgbClr val="000000"/>
+              </a:solidFill>
+              <a:uFill>
+                <a:solidFill>
+                  <a:srgbClr val="ffffff"/>
+                </a:solidFill>
+              </a:uFill>
+              <a:latin typeface="Arial"/>
+            </a:endParaRPr>
+          </a:p>
+          <a:p>
+            <a:r>
+              <a:rPr b="0" lang="en-US" sz="1800" spc="-1" strike="noStrike">
+                <a:solidFill>
+                  <a:srgbClr val="000000"/>
+                </a:solidFill>
+                <a:uFill>
+                  <a:solidFill>
+                    <a:srgbClr val="ffffff"/>
+                  </a:solidFill>
+                </a:uFill>
+                <a:latin typeface="Arial"/>
+              </a:rPr>
+              <a:t>DT is a NP-complete problem-- Brute force is used.</a:t>
+            </a:r>
+            <a:endParaRPr b="0" lang="en-US" sz="1800" spc="-1" strike="noStrike">
+              <a:solidFill>
+                <a:srgbClr val="000000"/>
+              </a:solidFill>
+              <a:uFill>
+                <a:solidFill>
+                  <a:srgbClr val="ffffff"/>
+                </a:solidFill>
+              </a:uFill>
+              <a:latin typeface="Arial"/>
+            </a:endParaRPr>
+          </a:p>
+        </p:txBody>
+      </p:sp>
+    </p:spTree>
+  </p:cSld>
+  <p:timing>
+    <p:tnLst>
+      <p:par>
+        <p:cTn id="11" dur="indefinite" restart="never" nodeType="tmRoot">
+          <p:childTnLst>
+            <p:seq>
+              <p:cTn id="12" nodeType="mainSeq"/>
+              <p:prevCondLst>
+                <p:cond delay="0" evt="onPrev">
+                  <p:tgtEl>
+                    <p:sldTgt/>
+                  </p:tgtEl>
+                </p:cond>
+              </p:prevCondLst>
+              <p:nextCondLst>
+                <p:cond delay="0" evt="onNext">
+                  <p:tgtEl>
+                    <p:sldTgt/>
+                  </p:tgtEl>
+                </p:cond>
+              </p:nextCondLst>
+            </p:seq>
+          </p:childTnLst>
+        </p:cTn>
+      </p:par>
+    </p:tnLst>
+  </p:timing>
+</p:sld>
+</file>
+
+<file path=ppt/slides/slide7.xml><?xml version="1.0" encoding="utf-8"?>
+<p:sld xmlns:a="http://schemas.openxmlformats.org/drawingml/2006/main" xmlns:p="http://schemas.openxmlformats.org/presentationml/2006/main" xmlns:r="http://schemas.openxmlformats.org/officeDocument/2006/relationships" xmlns:p14="http://schemas.microsoft.com/office/powerpoint/2010/main" xmlns:p15="http://schemas.microsoft.com/office/powerpoint/2012/main" xmlns:mc="http://schemas.openxmlformats.org/markup-compatibility/2006">
+  <p:cSld>
+    <p:spTree>
+      <p:nvGrpSpPr>
+        <p:cNvPr id="1" name=""/>
+        <p:cNvGrpSpPr/>
+        <p:nvPr/>
+      </p:nvGrpSpPr>
+      <p:grpSpPr>
+        <a:xfrm>
+          <a:off x="0" y="0"/>
+          <a:ext cx="0" cy="0"/>
+          <a:chOff x="0" y="0"/>
+          <a:chExt cx="0" cy="0"/>
+        </a:xfrm>
+      </p:grpSpPr>
+      <p:sp>
+        <p:nvSpPr>
+          <p:cNvPr id="57" name="TextShape 1"/>
+          <p:cNvSpPr txBox="1"/>
+          <p:nvPr/>
+        </p:nvSpPr>
+        <p:spPr>
+          <a:xfrm>
+            <a:off x="504000" y="301320"/>
+            <a:ext cx="9071640" cy="1262160"/>
+          </a:xfrm>
+          <a:prstGeom prst="rect">
+            <a:avLst/>
+          </a:prstGeom>
+          <a:noFill/>
+          <a:ln>
+            <a:noFill/>
+          </a:ln>
+        </p:spPr>
+        <p:txBody>
+          <a:bodyPr lIns="0" rIns="0" tIns="0" bIns="0" anchor="ctr"/>
+          <a:p>
+            <a:pPr algn="ctr"/>
+            <a:r>
+              <a:rPr b="0" lang="en-US" sz="4400" spc="-1" strike="noStrike">
+                <a:solidFill>
+                  <a:srgbClr val="000000"/>
+                </a:solidFill>
+                <a:uFill>
+                  <a:solidFill>
+                    <a:srgbClr val="ffffff"/>
+                  </a:solidFill>
+                </a:uFill>
+                <a:latin typeface="Arial"/>
+              </a:rPr>
+              <a:t>Multinomial Logistic Regression</a:t>
+            </a:r>
+            <a:endParaRPr b="0" lang="en-US" sz="4400" spc="-1" strike="noStrike">
+              <a:solidFill>
+                <a:srgbClr val="000000"/>
+              </a:solidFill>
+              <a:uFill>
+                <a:solidFill>
+                  <a:srgbClr val="ffffff"/>
+                </a:solidFill>
+              </a:uFill>
+              <a:latin typeface="Arial"/>
+            </a:endParaRPr>
+          </a:p>
+        </p:txBody>
+      </p:sp>
+      <p:pic>
+        <p:nvPicPr>
+          <p:cNvPr id="58" name="" descr=""/>
+          <p:cNvPicPr/>
+          <p:nvPr/>
+        </p:nvPicPr>
+        <p:blipFill>
+          <a:blip r:embed="rId1"/>
+          <a:stretch/>
+        </p:blipFill>
+        <p:spPr>
+          <a:xfrm>
+            <a:off x="1491120" y="1764360"/>
+            <a:ext cx="6942960" cy="5207400"/>
+          </a:xfrm>
+          <a:prstGeom prst="rect">
+            <a:avLst/>
+          </a:prstGeom>
+          <a:ln>
+            <a:noFill/>
+          </a:ln>
+        </p:spPr>
+      </p:pic>
+    </p:spTree>
+  </p:cSld>
+  <p:timing>
+    <p:tnLst>
+      <p:par>
+        <p:cTn id="13" dur="indefinite" restart="never" nodeType="tmRoot">
+          <p:childTnLst>
+            <p:seq>
+              <p:cTn id="14" nodeType="mainSeq"/>
+              <p:prevCondLst>
+                <p:cond delay="0" evt="onPrev">
+                  <p:tgtEl>
+                    <p:sldTgt/>
+                  </p:tgtEl>
+                </p:cond>
+              </p:prevCondLst>
+              <p:nextCondLst>
+                <p:cond delay="0" evt="onNext">
+                  <p:tgtEl>
+                    <p:sldTgt/>
+                  </p:tgtEl>
+                </p:cond>
+              </p:nextCondLst>
+            </p:seq>
+          </p:childTnLst>
+        </p:cTn>
+      </p:par>
+    </p:tnLst>
+  </p:timing>
+</p:sld>
+</file>
+
+<file path=ppt/slides/slide8.xml><?xml version="1.0" encoding="utf-8"?>
+<p:sld xmlns:a="http://schemas.openxmlformats.org/drawingml/2006/main" xmlns:p="http://schemas.openxmlformats.org/presentationml/2006/main" xmlns:r="http://schemas.openxmlformats.org/officeDocument/2006/relationships" xmlns:p14="http://schemas.microsoft.com/office/powerpoint/2010/main" xmlns:p15="http://schemas.microsoft.com/office/powerpoint/2012/main" xmlns:mc="http://schemas.openxmlformats.org/markup-compatibility/2006">
+  <p:cSld>
+    <p:spTree>
+      <p:nvGrpSpPr>
+        <p:cNvPr id="1" name=""/>
+        <p:cNvGrpSpPr/>
+        <p:nvPr/>
+      </p:nvGrpSpPr>
+      <p:grpSpPr>
+        <a:xfrm>
+          <a:off x="0" y="0"/>
+          <a:ext cx="0" cy="0"/>
+          <a:chOff x="0" y="0"/>
+          <a:chExt cx="0" cy="0"/>
+        </a:xfrm>
+      </p:grpSpPr>
+      <p:sp>
+        <p:nvSpPr>
+          <p:cNvPr id="59" name="TextShape 1"/>
+          <p:cNvSpPr txBox="1"/>
+          <p:nvPr/>
+        </p:nvSpPr>
+        <p:spPr>
+          <a:xfrm>
+            <a:off x="504000" y="301320"/>
+            <a:ext cx="9071640" cy="1262160"/>
+          </a:xfrm>
+          <a:prstGeom prst="rect">
+            <a:avLst/>
+          </a:prstGeom>
+          <a:noFill/>
+          <a:ln>
+            <a:noFill/>
+          </a:ln>
+        </p:spPr>
+        <p:txBody>
+          <a:bodyPr lIns="0" rIns="0" tIns="0" bIns="0" anchor="ctr"/>
+          <a:p>
+            <a:pPr algn="ctr"/>
+            <a:r>
+              <a:rPr b="0" lang="en-US" sz="4400" spc="-1" strike="noStrike">
+                <a:solidFill>
+                  <a:srgbClr val="000000"/>
+                </a:solidFill>
+                <a:uFill>
+                  <a:solidFill>
+                    <a:srgbClr val="ffffff"/>
+                  </a:solidFill>
+                </a:uFill>
+                <a:latin typeface="Arial"/>
+              </a:rPr>
+              <a:t>Multinomial Logistic Regression</a:t>
+            </a:r>
+            <a:endParaRPr b="0" lang="en-US" sz="4400" spc="-1" strike="noStrike">
+              <a:solidFill>
+                <a:srgbClr val="000000"/>
+              </a:solidFill>
+              <a:uFill>
+                <a:solidFill>
+                  <a:srgbClr val="ffffff"/>
+                </a:solidFill>
+              </a:uFill>
+              <a:latin typeface="Arial"/>
+            </a:endParaRPr>
+          </a:p>
+        </p:txBody>
+      </p:sp>
+      <p:pic>
+        <p:nvPicPr>
+          <p:cNvPr id="60" name="" descr=""/>
+          <p:cNvPicPr/>
+          <p:nvPr/>
+        </p:nvPicPr>
+        <p:blipFill>
+          <a:blip r:embed="rId1"/>
+          <a:stretch/>
+        </p:blipFill>
+        <p:spPr>
+          <a:xfrm>
+            <a:off x="499320" y="1395720"/>
+            <a:ext cx="9157320" cy="5922000"/>
+          </a:xfrm>
+          <a:prstGeom prst="rect">
+            <a:avLst/>
+          </a:prstGeom>
+          <a:ln>
+            <a:noFill/>
+          </a:ln>
+        </p:spPr>
+      </p:pic>
+    </p:spTree>
+  </p:cSld>
+  <p:timing>
+    <p:tnLst>
+      <p:par>
+        <p:cTn id="15" dur="indefinite" restart="never" nodeType="tmRoot">
+          <p:childTnLst>
+            <p:seq>
+              <p:cTn id="16" nodeType="mainSeq"/>
+              <p:prevCondLst>
+                <p:cond delay="0" evt="onPrev">
+                  <p:tgtEl>
+                    <p:sldTgt/>
+                  </p:tgtEl>
+                </p:cond>
+              </p:prevCondLst>
+              <p:nextCondLst>
+                <p:cond delay="0" evt="onNext">
+                  <p:tgtEl>
+                    <p:sldTgt/>
+                  </p:tgtEl>
+                </p:cond>
+              </p:nextCondLst>
+            </p:seq>
+          </p:childTnLst>
+        </p:cTn>
+      </p:par>
+    </p:tnLst>
+  </p:timing>
+</p:sld>
+</file>
+
+<file path=ppt/slides/slide9.xml><?xml version="1.0" encoding="utf-8"?>
+<p:sld xmlns:a="http://schemas.openxmlformats.org/drawingml/2006/main" xmlns:p="http://schemas.openxmlformats.org/presentationml/2006/main" xmlns:r="http://schemas.openxmlformats.org/officeDocument/2006/relationships" xmlns:p14="http://schemas.microsoft.com/office/powerpoint/2010/main" xmlns:p15="http://schemas.microsoft.com/office/powerpoint/2012/main" xmlns:mc="http://schemas.openxmlformats.org/markup-compatibility/2006">
+  <p:cSld>
+    <p:spTree>
+      <p:nvGrpSpPr>
+        <p:cNvPr id="1" name=""/>
+        <p:cNvGrpSpPr/>
+        <p:nvPr/>
+      </p:nvGrpSpPr>
+      <p:grpSpPr>
+        <a:xfrm>
+          <a:off x="0" y="0"/>
+          <a:ext cx="0" cy="0"/>
+          <a:chOff x="0" y="0"/>
+          <a:chExt cx="0" cy="0"/>
+        </a:xfrm>
+      </p:grpSpPr>
+      <p:sp>
+        <p:nvSpPr>
+          <p:cNvPr id="61" name="TextShape 1"/>
+          <p:cNvSpPr txBox="1"/>
+          <p:nvPr/>
+        </p:nvSpPr>
+        <p:spPr>
+          <a:xfrm>
+            <a:off x="504000" y="301320"/>
+            <a:ext cx="9071640" cy="1262160"/>
+          </a:xfrm>
+          <a:prstGeom prst="rect">
+            <a:avLst/>
+          </a:prstGeom>
+          <a:noFill/>
+          <a:ln>
+            <a:noFill/>
+          </a:ln>
+        </p:spPr>
+        <p:txBody>
+          <a:bodyPr lIns="0" rIns="0" tIns="0" bIns="0" anchor="ctr"/>
+          <a:p>
+            <a:pPr algn="ctr"/>
+            <a:r>
+              <a:rPr b="0" lang="en-US" sz="4400" spc="-1" strike="noStrike">
+                <a:solidFill>
+                  <a:srgbClr val="000000"/>
+                </a:solidFill>
+                <a:uFill>
+                  <a:solidFill>
+                    <a:srgbClr val="ffffff"/>
+                  </a:solidFill>
+                </a:uFill>
+                <a:latin typeface="Arial"/>
+              </a:rPr>
+              <a:t>Support Vector Machines </a:t>
+            </a:r>
+            <a:endParaRPr b="0" lang="en-US" sz="4400" spc="-1" strike="noStrike">
+              <a:solidFill>
+                <a:srgbClr val="000000"/>
+              </a:solidFill>
+              <a:uFill>
+                <a:solidFill>
+                  <a:srgbClr val="ffffff"/>
+                </a:solidFill>
+              </a:uFill>
+              <a:latin typeface="Arial"/>
+            </a:endParaRPr>
+          </a:p>
+        </p:txBody>
+      </p:sp>
+      <p:pic>
+        <p:nvPicPr>
+          <p:cNvPr id="62" name="" descr=""/>
+          <p:cNvPicPr/>
+          <p:nvPr/>
+        </p:nvPicPr>
+        <p:blipFill>
+          <a:blip r:embed="rId1"/>
+          <a:stretch/>
+        </p:blipFill>
+        <p:spPr>
+          <a:xfrm>
+            <a:off x="370800" y="1484280"/>
+            <a:ext cx="9709200" cy="5681160"/>
+          </a:xfrm>
+          <a:prstGeom prst="rect">
+            <a:avLst/>
+          </a:prstGeom>
+          <a:ln>
+            <a:noFill/>
+          </a:ln>
+        </p:spPr>
+      </p:pic>
+    </p:spTree>
+  </p:cSld>
+  <p:timing>
+    <p:tnLst>
+      <p:par>
+        <p:cTn id="17" dur="indefinite" restart="never" nodeType="tmRoot">
+          <p:childTnLst>
+            <p:seq>
+              <p:cTn id="18" nodeType="mainSeq"/>
               <p:prevCondLst>
                 <p:cond delay="0" evt="onPrev">
                   <p:tgtEl>

</xml_diff>